<commit_message>
Cambios en casa 09/02
</commit_message>
<xml_diff>
--- a/LabBook_010.pptx
+++ b/LabBook_010.pptx
@@ -6059,7 +6059,7 @@
         <p:spPr>
           <a:xfrm>
             <a:off x="609441" y="4860334"/>
-            <a:ext cx="11199971" cy="1938992"/>
+            <a:ext cx="11199971" cy="2123658"/>
           </a:xfrm>
           <a:prstGeom prst="rect">
             <a:avLst/>
@@ -6167,6 +6167,20 @@
                 <a:latin typeface="Arial" panose="020B0604020202020204" pitchFamily="34" charset="0"/>
                 <a:cs typeface="Arial" panose="020B0604020202020204" pitchFamily="34" charset="0"/>
               </a:rPr>
+              <a:t>aproximadamente</a:t>
+            </a:r>
+            <a:r>
+              <a:rPr lang="en-US" sz="1200" dirty="0">
+                <a:latin typeface="Arial" panose="020B0604020202020204" pitchFamily="34" charset="0"/>
+                <a:cs typeface="Arial" panose="020B0604020202020204" pitchFamily="34" charset="0"/>
+              </a:rPr>
+              <a:t> </a:t>
+            </a:r>
+            <a:r>
+              <a:rPr lang="en-US" sz="1200" dirty="0" err="1">
+                <a:latin typeface="Arial" panose="020B0604020202020204" pitchFamily="34" charset="0"/>
+                <a:cs typeface="Arial" panose="020B0604020202020204" pitchFamily="34" charset="0"/>
+              </a:rPr>
               <a:t>constante</a:t>
             </a:r>
             <a:r>
@@ -6188,41 +6202,237 @@
                 <a:latin typeface="Arial" panose="020B0604020202020204" pitchFamily="34" charset="0"/>
                 <a:cs typeface="Arial" panose="020B0604020202020204" pitchFamily="34" charset="0"/>
               </a:rPr>
-              <a:t> n(SiO2)=1.45775 </a:t>
+              <a:t> n(SiO2)=1.45775 y </a:t>
             </a:r>
             <a:r>
               <a:rPr lang="en-US" sz="1200" dirty="0" err="1">
                 <a:latin typeface="Arial" panose="020B0604020202020204" pitchFamily="34" charset="0"/>
                 <a:cs typeface="Arial" panose="020B0604020202020204" pitchFamily="34" charset="0"/>
               </a:rPr>
-              <a:t>aprox</a:t>
+              <a:t>los</a:t>
             </a:r>
             <a:r>
               <a:rPr lang="en-US" sz="1200" dirty="0">
                 <a:latin typeface="Arial" panose="020B0604020202020204" pitchFamily="34" charset="0"/>
                 <a:cs typeface="Arial" panose="020B0604020202020204" pitchFamily="34" charset="0"/>
               </a:rPr>
-              <a:t>. y </a:t>
+              <a:t> cuatro </a:t>
             </a:r>
             <a:r>
               <a:rPr lang="en-US" sz="1200" dirty="0" err="1">
                 <a:latin typeface="Arial" panose="020B0604020202020204" pitchFamily="34" charset="0"/>
                 <a:cs typeface="Arial" panose="020B0604020202020204" pitchFamily="34" charset="0"/>
               </a:rPr>
-              <a:t>los</a:t>
+              <a:t>modos</a:t>
             </a:r>
             <a:r>
               <a:rPr lang="en-US" sz="1200" dirty="0">
                 <a:latin typeface="Arial" panose="020B0604020202020204" pitchFamily="34" charset="0"/>
                 <a:cs typeface="Arial" panose="020B0604020202020204" pitchFamily="34" charset="0"/>
               </a:rPr>
-              <a:t> cuatro </a:t>
+              <a:t> </a:t>
             </a:r>
             <a:r>
               <a:rPr lang="en-US" sz="1200" dirty="0" err="1">
                 <a:latin typeface="Arial" panose="020B0604020202020204" pitchFamily="34" charset="0"/>
                 <a:cs typeface="Arial" panose="020B0604020202020204" pitchFamily="34" charset="0"/>
               </a:rPr>
+              <a:t>calculados</a:t>
+            </a:r>
+            <a:r>
+              <a:rPr lang="en-US" sz="1200" dirty="0">
+                <a:latin typeface="Arial" panose="020B0604020202020204" pitchFamily="34" charset="0"/>
+                <a:cs typeface="Arial" panose="020B0604020202020204" pitchFamily="34" charset="0"/>
+              </a:rPr>
+              <a:t> </a:t>
+            </a:r>
+            <a:r>
+              <a:rPr lang="en-US" sz="1200" dirty="0" err="1">
+                <a:latin typeface="Arial" panose="020B0604020202020204" pitchFamily="34" charset="0"/>
+                <a:cs typeface="Arial" panose="020B0604020202020204" pitchFamily="34" charset="0"/>
+              </a:rPr>
+              <a:t>mantienen</a:t>
+            </a:r>
+            <a:r>
+              <a:rPr lang="en-US" sz="1200" dirty="0">
+                <a:latin typeface="Arial" panose="020B0604020202020204" pitchFamily="34" charset="0"/>
+                <a:cs typeface="Arial" panose="020B0604020202020204" pitchFamily="34" charset="0"/>
+              </a:rPr>
+              <a:t> </a:t>
+            </a:r>
+            <a:r>
+              <a:rPr lang="en-US" sz="1200" dirty="0" err="1">
+                <a:latin typeface="Arial" panose="020B0604020202020204" pitchFamily="34" charset="0"/>
+                <a:cs typeface="Arial" panose="020B0604020202020204" pitchFamily="34" charset="0"/>
+              </a:rPr>
+              <a:t>su</a:t>
+            </a:r>
+            <a:r>
+              <a:rPr lang="en-US" sz="1200" dirty="0">
+                <a:latin typeface="Arial" panose="020B0604020202020204" pitchFamily="34" charset="0"/>
+                <a:cs typeface="Arial" panose="020B0604020202020204" pitchFamily="34" charset="0"/>
+              </a:rPr>
+              <a:t> </a:t>
+            </a:r>
+            <a:r>
+              <a:rPr lang="en-US" sz="1200" dirty="0" err="1">
+                <a:latin typeface="Arial" panose="020B0604020202020204" pitchFamily="34" charset="0"/>
+                <a:cs typeface="Arial" panose="020B0604020202020204" pitchFamily="34" charset="0"/>
+              </a:rPr>
+              <a:t>n_eff</a:t>
+            </a:r>
+            <a:r>
+              <a:rPr lang="en-US" sz="1200" dirty="0">
+                <a:latin typeface="Arial" panose="020B0604020202020204" pitchFamily="34" charset="0"/>
+                <a:cs typeface="Arial" panose="020B0604020202020204" pitchFamily="34" charset="0"/>
+              </a:rPr>
+              <a:t> </a:t>
+            </a:r>
+            <a:r>
+              <a:rPr lang="en-US" sz="1200" dirty="0" err="1">
+                <a:latin typeface="Arial" panose="020B0604020202020204" pitchFamily="34" charset="0"/>
+                <a:cs typeface="Arial" panose="020B0604020202020204" pitchFamily="34" charset="0"/>
+              </a:rPr>
+              <a:t>por</a:t>
+            </a:r>
+            <a:r>
+              <a:rPr lang="en-US" sz="1200" dirty="0">
+                <a:latin typeface="Arial" panose="020B0604020202020204" pitchFamily="34" charset="0"/>
+                <a:cs typeface="Arial" panose="020B0604020202020204" pitchFamily="34" charset="0"/>
+              </a:rPr>
+              <a:t> </a:t>
+            </a:r>
+            <a:r>
+              <a:rPr lang="en-US" sz="1200" dirty="0" err="1">
+                <a:latin typeface="Arial" panose="020B0604020202020204" pitchFamily="34" charset="0"/>
+                <a:cs typeface="Arial" panose="020B0604020202020204" pitchFamily="34" charset="0"/>
+              </a:rPr>
+              <a:t>encima</a:t>
+            </a:r>
+            <a:r>
+              <a:rPr lang="en-US" sz="1200" dirty="0">
+                <a:latin typeface="Arial" panose="020B0604020202020204" pitchFamily="34" charset="0"/>
+                <a:cs typeface="Arial" panose="020B0604020202020204" pitchFamily="34" charset="0"/>
+              </a:rPr>
+              <a:t> de </a:t>
+            </a:r>
+            <a:r>
+              <a:rPr lang="en-US" sz="1200" dirty="0" err="1">
+                <a:latin typeface="Arial" panose="020B0604020202020204" pitchFamily="34" charset="0"/>
+                <a:cs typeface="Arial" panose="020B0604020202020204" pitchFamily="34" charset="0"/>
+              </a:rPr>
+              <a:t>este</a:t>
+            </a:r>
+            <a:r>
+              <a:rPr lang="en-US" sz="1200" dirty="0">
+                <a:latin typeface="Arial" panose="020B0604020202020204" pitchFamily="34" charset="0"/>
+                <a:cs typeface="Arial" panose="020B0604020202020204" pitchFamily="34" charset="0"/>
+              </a:rPr>
+              <a:t> valor, </a:t>
+            </a:r>
+            <a:r>
+              <a:rPr lang="en-US" sz="1200" dirty="0" err="1">
+                <a:latin typeface="Arial" panose="020B0604020202020204" pitchFamily="34" charset="0"/>
+                <a:cs typeface="Arial" panose="020B0604020202020204" pitchFamily="34" charset="0"/>
+              </a:rPr>
+              <a:t>por</a:t>
+            </a:r>
+            <a:r>
+              <a:rPr lang="en-US" sz="1200" dirty="0">
+                <a:latin typeface="Arial" panose="020B0604020202020204" pitchFamily="34" charset="0"/>
+                <a:cs typeface="Arial" panose="020B0604020202020204" pitchFamily="34" charset="0"/>
+              </a:rPr>
+              <a:t> lo </a:t>
+            </a:r>
+            <a:r>
+              <a:rPr lang="en-US" sz="1200" dirty="0" err="1">
+                <a:latin typeface="Arial" panose="020B0604020202020204" pitchFamily="34" charset="0"/>
+                <a:cs typeface="Arial" panose="020B0604020202020204" pitchFamily="34" charset="0"/>
+              </a:rPr>
+              <a:t>que</a:t>
+            </a:r>
+            <a:r>
+              <a:rPr lang="en-US" sz="1200" dirty="0">
+                <a:latin typeface="Arial" panose="020B0604020202020204" pitchFamily="34" charset="0"/>
+                <a:cs typeface="Arial" panose="020B0604020202020204" pitchFamily="34" charset="0"/>
+              </a:rPr>
+              <a:t> </a:t>
+            </a:r>
+            <a:r>
+              <a:rPr lang="en-US" sz="1200" dirty="0" err="1">
+                <a:latin typeface="Arial" panose="020B0604020202020204" pitchFamily="34" charset="0"/>
+                <a:cs typeface="Arial" panose="020B0604020202020204" pitchFamily="34" charset="0"/>
+              </a:rPr>
+              <a:t>todos</a:t>
+            </a:r>
+            <a:r>
+              <a:rPr lang="en-US" sz="1200" dirty="0">
+                <a:latin typeface="Arial" panose="020B0604020202020204" pitchFamily="34" charset="0"/>
+                <a:cs typeface="Arial" panose="020B0604020202020204" pitchFamily="34" charset="0"/>
+              </a:rPr>
+              <a:t> se </a:t>
+            </a:r>
+            <a:r>
+              <a:rPr lang="en-US" sz="1200" dirty="0" err="1">
+                <a:latin typeface="Arial" panose="020B0604020202020204" pitchFamily="34" charset="0"/>
+                <a:cs typeface="Arial" panose="020B0604020202020204" pitchFamily="34" charset="0"/>
+              </a:rPr>
+              <a:t>propagan</a:t>
+            </a:r>
+            <a:r>
+              <a:rPr lang="en-US" sz="1200" dirty="0">
+                <a:latin typeface="Arial" panose="020B0604020202020204" pitchFamily="34" charset="0"/>
+                <a:cs typeface="Arial" panose="020B0604020202020204" pitchFamily="34" charset="0"/>
+              </a:rPr>
+              <a:t> a </a:t>
+            </a:r>
+            <a:r>
+              <a:rPr lang="en-US" sz="1200" dirty="0" err="1">
+                <a:latin typeface="Arial" panose="020B0604020202020204" pitchFamily="34" charset="0"/>
+                <a:cs typeface="Arial" panose="020B0604020202020204" pitchFamily="34" charset="0"/>
+              </a:rPr>
+              <a:t>través</a:t>
+            </a:r>
+            <a:r>
+              <a:rPr lang="en-US" sz="1200" dirty="0">
+                <a:latin typeface="Arial" panose="020B0604020202020204" pitchFamily="34" charset="0"/>
+                <a:cs typeface="Arial" panose="020B0604020202020204" pitchFamily="34" charset="0"/>
+              </a:rPr>
+              <a:t> de la </a:t>
+            </a:r>
+            <a:r>
+              <a:rPr lang="en-US" sz="1200" dirty="0" err="1">
+                <a:latin typeface="Arial" panose="020B0604020202020204" pitchFamily="34" charset="0"/>
+                <a:cs typeface="Arial" panose="020B0604020202020204" pitchFamily="34" charset="0"/>
+              </a:rPr>
+              <a:t>guía</a:t>
+            </a:r>
+            <a:r>
+              <a:rPr lang="en-US" sz="1200" dirty="0">
+                <a:latin typeface="Arial" panose="020B0604020202020204" pitchFamily="34" charset="0"/>
+                <a:cs typeface="Arial" panose="020B0604020202020204" pitchFamily="34" charset="0"/>
+              </a:rPr>
+              <a:t> shallow. </a:t>
+            </a:r>
+            <a:r>
+              <a:rPr lang="en-US" sz="1200" dirty="0" err="1">
+                <a:latin typeface="Arial" panose="020B0604020202020204" pitchFamily="34" charset="0"/>
+                <a:cs typeface="Arial" panose="020B0604020202020204" pitchFamily="34" charset="0"/>
+              </a:rPr>
+              <a:t>Estos</a:t>
+            </a:r>
+            <a:r>
+              <a:rPr lang="en-US" sz="1200" dirty="0">
+                <a:latin typeface="Arial" panose="020B0604020202020204" pitchFamily="34" charset="0"/>
+                <a:cs typeface="Arial" panose="020B0604020202020204" pitchFamily="34" charset="0"/>
+              </a:rPr>
+              <a:t> </a:t>
+            </a:r>
+            <a:r>
+              <a:rPr lang="en-US" sz="1200" dirty="0" err="1">
+                <a:latin typeface="Arial" panose="020B0604020202020204" pitchFamily="34" charset="0"/>
+                <a:cs typeface="Arial" panose="020B0604020202020204" pitchFamily="34" charset="0"/>
+              </a:rPr>
               <a:t>modos</a:t>
             </a:r>
             <a:r>
@@ -6230,6 +6440,20 @@
                 <a:latin typeface="Arial" panose="020B0604020202020204" pitchFamily="34" charset="0"/>
                 <a:cs typeface="Arial" panose="020B0604020202020204" pitchFamily="34" charset="0"/>
               </a:rPr>
+              <a:t> son, </a:t>
+            </a:r>
+            <a:r>
+              <a:rPr lang="en-US" sz="1200" dirty="0" err="1">
+                <a:latin typeface="Arial" panose="020B0604020202020204" pitchFamily="34" charset="0"/>
+                <a:cs typeface="Arial" panose="020B0604020202020204" pitchFamily="34" charset="0"/>
+              </a:rPr>
+              <a:t>en</a:t>
+            </a:r>
+            <a:r>
+              <a:rPr lang="en-US" sz="1200" dirty="0">
+                <a:latin typeface="Arial" panose="020B0604020202020204" pitchFamily="34" charset="0"/>
+                <a:cs typeface="Arial" panose="020B0604020202020204" pitchFamily="34" charset="0"/>
+              </a:rPr>
               <a:t> </a:t>
             </a:r>
             <a:r>
@@ -6237,7 +6461,7 @@
                 <a:latin typeface="Arial" panose="020B0604020202020204" pitchFamily="34" charset="0"/>
                 <a:cs typeface="Arial" panose="020B0604020202020204" pitchFamily="34" charset="0"/>
               </a:rPr>
-              <a:t>calculados</a:t>
+              <a:t>orden</a:t>
             </a:r>
             <a:r>
               <a:rPr lang="en-US" sz="1200" dirty="0">
@@ -6251,13 +6475,41 @@
                 <a:latin typeface="Arial" panose="020B0604020202020204" pitchFamily="34" charset="0"/>
                 <a:cs typeface="Arial" panose="020B0604020202020204" pitchFamily="34" charset="0"/>
               </a:rPr>
-              <a:t>mantienen</a:t>
+              <a:t>creciente</a:t>
             </a:r>
             <a:r>
               <a:rPr lang="en-US" sz="1200" dirty="0">
                 <a:latin typeface="Arial" panose="020B0604020202020204" pitchFamily="34" charset="0"/>
                 <a:cs typeface="Arial" panose="020B0604020202020204" pitchFamily="34" charset="0"/>
               </a:rPr>
+              <a:t>: TE (Mode 0), TM (Mode 1), </a:t>
+            </a:r>
+            <a:r>
+              <a:rPr lang="en-US" sz="1200" dirty="0" err="1">
+                <a:latin typeface="Arial" panose="020B0604020202020204" pitchFamily="34" charset="0"/>
+                <a:cs typeface="Arial" panose="020B0604020202020204" pitchFamily="34" charset="0"/>
+              </a:rPr>
+              <a:t>híbrido</a:t>
+            </a:r>
+            <a:r>
+              <a:rPr lang="en-US" sz="1200" dirty="0">
+                <a:latin typeface="Arial" panose="020B0604020202020204" pitchFamily="34" charset="0"/>
+                <a:cs typeface="Arial" panose="020B0604020202020204" pitchFamily="34" charset="0"/>
+              </a:rPr>
+              <a:t> (Mode 2), TE (Mode 3). Para </a:t>
+            </a:r>
+            <a:r>
+              <a:rPr lang="en-US" sz="1200" dirty="0" err="1">
+                <a:latin typeface="Arial" panose="020B0604020202020204" pitchFamily="34" charset="0"/>
+                <a:cs typeface="Arial" panose="020B0604020202020204" pitchFamily="34" charset="0"/>
+              </a:rPr>
+              <a:t>este</a:t>
+            </a:r>
+            <a:r>
+              <a:rPr lang="en-US" sz="1200" dirty="0">
+                <a:latin typeface="Arial" panose="020B0604020202020204" pitchFamily="34" charset="0"/>
+                <a:cs typeface="Arial" panose="020B0604020202020204" pitchFamily="34" charset="0"/>
+              </a:rPr>
               <a:t> </a:t>
             </a:r>
             <a:r>
@@ -6265,7 +6517,7 @@
                 <a:latin typeface="Arial" panose="020B0604020202020204" pitchFamily="34" charset="0"/>
                 <a:cs typeface="Arial" panose="020B0604020202020204" pitchFamily="34" charset="0"/>
               </a:rPr>
-              <a:t>su</a:t>
+              <a:t>caso</a:t>
             </a:r>
             <a:r>
               <a:rPr lang="en-US" sz="1200" dirty="0">
@@ -6279,7 +6531,7 @@
                 <a:latin typeface="Arial" panose="020B0604020202020204" pitchFamily="34" charset="0"/>
                 <a:cs typeface="Arial" panose="020B0604020202020204" pitchFamily="34" charset="0"/>
               </a:rPr>
-              <a:t>n_eff</a:t>
+              <a:t>tendría</a:t>
             </a:r>
             <a:r>
               <a:rPr lang="en-US" sz="1200" dirty="0">
@@ -6293,7 +6545,7 @@
                 <a:latin typeface="Arial" panose="020B0604020202020204" pitchFamily="34" charset="0"/>
                 <a:cs typeface="Arial" panose="020B0604020202020204" pitchFamily="34" charset="0"/>
               </a:rPr>
-              <a:t>por</a:t>
+              <a:t>sentido</a:t>
             </a:r>
             <a:r>
               <a:rPr lang="en-US" sz="1200" dirty="0">
@@ -6307,13 +6559,27 @@
                 <a:latin typeface="Arial" panose="020B0604020202020204" pitchFamily="34" charset="0"/>
                 <a:cs typeface="Arial" panose="020B0604020202020204" pitchFamily="34" charset="0"/>
               </a:rPr>
-              <a:t>encima</a:t>
+              <a:t>calcular</a:t>
             </a:r>
             <a:r>
               <a:rPr lang="en-US" sz="1200" dirty="0">
                 <a:latin typeface="Arial" panose="020B0604020202020204" pitchFamily="34" charset="0"/>
                 <a:cs typeface="Arial" panose="020B0604020202020204" pitchFamily="34" charset="0"/>
               </a:rPr>
+              <a:t> un mayor </a:t>
+            </a:r>
+            <a:r>
+              <a:rPr lang="en-US" sz="1200" dirty="0" err="1">
+                <a:latin typeface="Arial" panose="020B0604020202020204" pitchFamily="34" charset="0"/>
+                <a:cs typeface="Arial" panose="020B0604020202020204" pitchFamily="34" charset="0"/>
+              </a:rPr>
+              <a:t>número</a:t>
+            </a:r>
+            <a:r>
+              <a:rPr lang="en-US" sz="1200" dirty="0">
+                <a:latin typeface="Arial" panose="020B0604020202020204" pitchFamily="34" charset="0"/>
+                <a:cs typeface="Arial" panose="020B0604020202020204" pitchFamily="34" charset="0"/>
+              </a:rPr>
               <a:t> de </a:t>
             </a:r>
             <a:r>
@@ -6321,34 +6587,48 @@
                 <a:latin typeface="Arial" panose="020B0604020202020204" pitchFamily="34" charset="0"/>
                 <a:cs typeface="Arial" panose="020B0604020202020204" pitchFamily="34" charset="0"/>
               </a:rPr>
-              <a:t>este</a:t>
+              <a:t>modos</a:t>
             </a:r>
             <a:r>
               <a:rPr lang="en-US" sz="1200" dirty="0">
                 <a:latin typeface="Arial" panose="020B0604020202020204" pitchFamily="34" charset="0"/>
                 <a:cs typeface="Arial" panose="020B0604020202020204" pitchFamily="34" charset="0"/>
               </a:rPr>
-              <a:t> valor, </a:t>
+              <a:t> </a:t>
             </a:r>
             <a:r>
               <a:rPr lang="en-US" sz="1200" dirty="0" err="1">
                 <a:latin typeface="Arial" panose="020B0604020202020204" pitchFamily="34" charset="0"/>
                 <a:cs typeface="Arial" panose="020B0604020202020204" pitchFamily="34" charset="0"/>
               </a:rPr>
-              <a:t>por</a:t>
+              <a:t>solución</a:t>
             </a:r>
             <a:r>
               <a:rPr lang="en-US" sz="1200" dirty="0">
                 <a:latin typeface="Arial" panose="020B0604020202020204" pitchFamily="34" charset="0"/>
                 <a:cs typeface="Arial" panose="020B0604020202020204" pitchFamily="34" charset="0"/>
               </a:rPr>
-              <a:t> lo </a:t>
+              <a:t>, </a:t>
             </a:r>
             <a:r>
               <a:rPr lang="en-US" sz="1200" dirty="0" err="1">
                 <a:latin typeface="Arial" panose="020B0604020202020204" pitchFamily="34" charset="0"/>
                 <a:cs typeface="Arial" panose="020B0604020202020204" pitchFamily="34" charset="0"/>
               </a:rPr>
+              <a:t>ya</a:t>
+            </a:r>
+            <a:r>
+              <a:rPr lang="en-US" sz="1200" dirty="0">
+                <a:latin typeface="Arial" panose="020B0604020202020204" pitchFamily="34" charset="0"/>
+                <a:cs typeface="Arial" panose="020B0604020202020204" pitchFamily="34" charset="0"/>
+              </a:rPr>
+              <a:t> </a:t>
+            </a:r>
+            <a:r>
+              <a:rPr lang="en-US" sz="1200" dirty="0" err="1">
+                <a:latin typeface="Arial" panose="020B0604020202020204" pitchFamily="34" charset="0"/>
+                <a:cs typeface="Arial" panose="020B0604020202020204" pitchFamily="34" charset="0"/>
+              </a:rPr>
               <a:t>que</a:t>
             </a:r>
             <a:r>
@@ -6363,112 +6643,70 @@
                 <a:latin typeface="Arial" panose="020B0604020202020204" pitchFamily="34" charset="0"/>
                 <a:cs typeface="Arial" panose="020B0604020202020204" pitchFamily="34" charset="0"/>
               </a:rPr>
-              <a:t>todos</a:t>
+              <a:t>todavía</a:t>
             </a:r>
             <a:r>
               <a:rPr lang="en-US" sz="1200" dirty="0">
                 <a:latin typeface="Arial" panose="020B0604020202020204" pitchFamily="34" charset="0"/>
                 <a:cs typeface="Arial" panose="020B0604020202020204" pitchFamily="34" charset="0"/>
               </a:rPr>
-              <a:t> se </a:t>
+              <a:t> hay </a:t>
             </a:r>
             <a:r>
               <a:rPr lang="en-US" sz="1200" dirty="0" err="1">
                 <a:latin typeface="Arial" panose="020B0604020202020204" pitchFamily="34" charset="0"/>
                 <a:cs typeface="Arial" panose="020B0604020202020204" pitchFamily="34" charset="0"/>
               </a:rPr>
-              <a:t>propagan</a:t>
+              <a:t>margen</a:t>
             </a:r>
             <a:r>
               <a:rPr lang="en-US" sz="1200" dirty="0">
                 <a:latin typeface="Arial" panose="020B0604020202020204" pitchFamily="34" charset="0"/>
                 <a:cs typeface="Arial" panose="020B0604020202020204" pitchFamily="34" charset="0"/>
               </a:rPr>
+              <a:t> hasta la </a:t>
+            </a:r>
+            <a:r>
+              <a:rPr lang="en-US" sz="1200" dirty="0" err="1">
+                <a:latin typeface="Arial" panose="020B0604020202020204" pitchFamily="34" charset="0"/>
+                <a:cs typeface="Arial" panose="020B0604020202020204" pitchFamily="34" charset="0"/>
+              </a:rPr>
+              <a:t>línea</a:t>
+            </a:r>
+            <a:r>
+              <a:rPr lang="en-US" sz="1200" dirty="0">
+                <a:latin typeface="Arial" panose="020B0604020202020204" pitchFamily="34" charset="0"/>
+                <a:cs typeface="Arial" panose="020B0604020202020204" pitchFamily="34" charset="0"/>
+              </a:rPr>
+              <a:t> </a:t>
+            </a:r>
+            <a:r>
+              <a:rPr lang="en-US" sz="1200" dirty="0" err="1">
+                <a:latin typeface="Arial" panose="020B0604020202020204" pitchFamily="34" charset="0"/>
+                <a:cs typeface="Arial" panose="020B0604020202020204" pitchFamily="34" charset="0"/>
+              </a:rPr>
+              <a:t>discontinua</a:t>
+            </a:r>
+            <a:r>
+              <a:rPr lang="en-US" sz="1200" dirty="0">
+                <a:latin typeface="Arial" panose="020B0604020202020204" pitchFamily="34" charset="0"/>
+                <a:cs typeface="Arial" panose="020B0604020202020204" pitchFamily="34" charset="0"/>
+              </a:rPr>
+              <a:t> </a:t>
+            </a:r>
+            <a:r>
+              <a:rPr lang="en-US" sz="1200" dirty="0" err="1">
+                <a:latin typeface="Arial" panose="020B0604020202020204" pitchFamily="34" charset="0"/>
+                <a:cs typeface="Arial" panose="020B0604020202020204" pitchFamily="34" charset="0"/>
+              </a:rPr>
+              <a:t>negra</a:t>
+            </a:r>
+            <a:r>
+              <a:rPr lang="en-US" sz="1200" dirty="0">
+                <a:latin typeface="Arial" panose="020B0604020202020204" pitchFamily="34" charset="0"/>
+                <a:cs typeface="Arial" panose="020B0604020202020204" pitchFamily="34" charset="0"/>
+              </a:rPr>
               <a:t>. </a:t>
-            </a:r>
-            <a:r>
-              <a:rPr lang="en-US" sz="1200" dirty="0" err="1">
-                <a:latin typeface="Arial" panose="020B0604020202020204" pitchFamily="34" charset="0"/>
-                <a:cs typeface="Arial" panose="020B0604020202020204" pitchFamily="34" charset="0"/>
-              </a:rPr>
-              <a:t>Estos</a:t>
-            </a:r>
-            <a:r>
-              <a:rPr lang="en-US" sz="1200" dirty="0">
-                <a:latin typeface="Arial" panose="020B0604020202020204" pitchFamily="34" charset="0"/>
-                <a:cs typeface="Arial" panose="020B0604020202020204" pitchFamily="34" charset="0"/>
-              </a:rPr>
-              <a:t> </a:t>
-            </a:r>
-            <a:r>
-              <a:rPr lang="en-US" sz="1200" dirty="0" err="1">
-                <a:latin typeface="Arial" panose="020B0604020202020204" pitchFamily="34" charset="0"/>
-                <a:cs typeface="Arial" panose="020B0604020202020204" pitchFamily="34" charset="0"/>
-              </a:rPr>
-              <a:t>modos</a:t>
-            </a:r>
-            <a:r>
-              <a:rPr lang="en-US" sz="1200" dirty="0">
-                <a:latin typeface="Arial" panose="020B0604020202020204" pitchFamily="34" charset="0"/>
-                <a:cs typeface="Arial" panose="020B0604020202020204" pitchFamily="34" charset="0"/>
-              </a:rPr>
-              <a:t> son, </a:t>
-            </a:r>
-            <a:r>
-              <a:rPr lang="en-US" sz="1200" dirty="0" err="1">
-                <a:latin typeface="Arial" panose="020B0604020202020204" pitchFamily="34" charset="0"/>
-                <a:cs typeface="Arial" panose="020B0604020202020204" pitchFamily="34" charset="0"/>
-              </a:rPr>
-              <a:t>en</a:t>
-            </a:r>
-            <a:r>
-              <a:rPr lang="en-US" sz="1200" dirty="0">
-                <a:latin typeface="Arial" panose="020B0604020202020204" pitchFamily="34" charset="0"/>
-                <a:cs typeface="Arial" panose="020B0604020202020204" pitchFamily="34" charset="0"/>
-              </a:rPr>
-              <a:t> </a:t>
-            </a:r>
-            <a:r>
-              <a:rPr lang="en-US" sz="1200" dirty="0" err="1">
-                <a:latin typeface="Arial" panose="020B0604020202020204" pitchFamily="34" charset="0"/>
-                <a:cs typeface="Arial" panose="020B0604020202020204" pitchFamily="34" charset="0"/>
-              </a:rPr>
-              <a:t>orden</a:t>
-            </a:r>
-            <a:r>
-              <a:rPr lang="en-US" sz="1200" dirty="0">
-                <a:latin typeface="Arial" panose="020B0604020202020204" pitchFamily="34" charset="0"/>
-                <a:cs typeface="Arial" panose="020B0604020202020204" pitchFamily="34" charset="0"/>
-              </a:rPr>
-              <a:t> </a:t>
-            </a:r>
-            <a:r>
-              <a:rPr lang="en-US" sz="1200" dirty="0" err="1">
-                <a:latin typeface="Arial" panose="020B0604020202020204" pitchFamily="34" charset="0"/>
-                <a:cs typeface="Arial" panose="020B0604020202020204" pitchFamily="34" charset="0"/>
-              </a:rPr>
-              <a:t>creciente</a:t>
-            </a:r>
-            <a:r>
-              <a:rPr lang="en-US" sz="1200" dirty="0">
-                <a:latin typeface="Arial" panose="020B0604020202020204" pitchFamily="34" charset="0"/>
-                <a:cs typeface="Arial" panose="020B0604020202020204" pitchFamily="34" charset="0"/>
-              </a:rPr>
-              <a:t>: TE (Mode 0), TM (Mode 1), </a:t>
-            </a:r>
-            <a:r>
-              <a:rPr lang="en-US" sz="1200" dirty="0" err="1">
-                <a:latin typeface="Arial" panose="020B0604020202020204" pitchFamily="34" charset="0"/>
-                <a:cs typeface="Arial" panose="020B0604020202020204" pitchFamily="34" charset="0"/>
-              </a:rPr>
-              <a:t>híbrido</a:t>
-            </a:r>
-            <a:r>
-              <a:rPr lang="en-US" sz="1200" dirty="0">
-                <a:latin typeface="Arial" panose="020B0604020202020204" pitchFamily="34" charset="0"/>
-                <a:cs typeface="Arial" panose="020B0604020202020204" pitchFamily="34" charset="0"/>
-              </a:rPr>
-              <a:t> (Mode 2), TE (Mode 3).</a:t>
             </a:r>
           </a:p>
           <a:p>
@@ -6480,13 +6718,6 @@
           </a:p>
           <a:p>
             <a:pPr algn="just"/>
-            <a:endParaRPr lang="en-US" sz="1200" dirty="0">
-              <a:latin typeface="Arial" panose="020B0604020202020204" pitchFamily="34" charset="0"/>
-              <a:cs typeface="Arial" panose="020B0604020202020204" pitchFamily="34" charset="0"/>
-            </a:endParaRPr>
-          </a:p>
-          <a:p>
-            <a:pPr algn="just"/>
             <a:r>
               <a:rPr lang="en-US" sz="1200" dirty="0" err="1">
                 <a:latin typeface="Arial" panose="020B0604020202020204" pitchFamily="34" charset="0"/>
@@ -6499,7 +6730,315 @@
                 <a:latin typeface="Arial" panose="020B0604020202020204" pitchFamily="34" charset="0"/>
                 <a:cs typeface="Arial" panose="020B0604020202020204" pitchFamily="34" charset="0"/>
               </a:rPr>
-              <a:t>:</a:t>
+              <a:t>: </a:t>
+            </a:r>
+            <a:r>
+              <a:rPr lang="en-US" sz="1200" dirty="0" err="1">
+                <a:latin typeface="Arial" panose="020B0604020202020204" pitchFamily="34" charset="0"/>
+                <a:cs typeface="Arial" panose="020B0604020202020204" pitchFamily="34" charset="0"/>
+              </a:rPr>
+              <a:t>en</a:t>
+            </a:r>
+            <a:r>
+              <a:rPr lang="en-US" sz="1200" dirty="0">
+                <a:latin typeface="Arial" panose="020B0604020202020204" pitchFamily="34" charset="0"/>
+                <a:cs typeface="Arial" panose="020B0604020202020204" pitchFamily="34" charset="0"/>
+              </a:rPr>
+              <a:t> </a:t>
+            </a:r>
+            <a:r>
+              <a:rPr lang="en-US" sz="1200" dirty="0" err="1">
+                <a:latin typeface="Arial" panose="020B0604020202020204" pitchFamily="34" charset="0"/>
+                <a:cs typeface="Arial" panose="020B0604020202020204" pitchFamily="34" charset="0"/>
+              </a:rPr>
+              <a:t>este</a:t>
+            </a:r>
+            <a:r>
+              <a:rPr lang="en-US" sz="1200" dirty="0">
+                <a:latin typeface="Arial" panose="020B0604020202020204" pitchFamily="34" charset="0"/>
+                <a:cs typeface="Arial" panose="020B0604020202020204" pitchFamily="34" charset="0"/>
+              </a:rPr>
+              <a:t> </a:t>
+            </a:r>
+            <a:r>
+              <a:rPr lang="en-US" sz="1200" dirty="0" err="1">
+                <a:latin typeface="Arial" panose="020B0604020202020204" pitchFamily="34" charset="0"/>
+                <a:cs typeface="Arial" panose="020B0604020202020204" pitchFamily="34" charset="0"/>
+              </a:rPr>
+              <a:t>caso</a:t>
+            </a:r>
+            <a:r>
+              <a:rPr lang="en-US" sz="1200" dirty="0">
+                <a:latin typeface="Arial" panose="020B0604020202020204" pitchFamily="34" charset="0"/>
+                <a:cs typeface="Arial" panose="020B0604020202020204" pitchFamily="34" charset="0"/>
+              </a:rPr>
+              <a:t> solo </a:t>
+            </a:r>
+            <a:r>
+              <a:rPr lang="en-US" sz="1200" dirty="0" err="1">
+                <a:latin typeface="Arial" panose="020B0604020202020204" pitchFamily="34" charset="0"/>
+                <a:cs typeface="Arial" panose="020B0604020202020204" pitchFamily="34" charset="0"/>
+              </a:rPr>
+              <a:t>los</a:t>
+            </a:r>
+            <a:r>
+              <a:rPr lang="en-US" sz="1200" dirty="0">
+                <a:latin typeface="Arial" panose="020B0604020202020204" pitchFamily="34" charset="0"/>
+                <a:cs typeface="Arial" panose="020B0604020202020204" pitchFamily="34" charset="0"/>
+              </a:rPr>
+              <a:t> dos </a:t>
+            </a:r>
+            <a:r>
+              <a:rPr lang="en-US" sz="1200" dirty="0" err="1">
+                <a:latin typeface="Arial" panose="020B0604020202020204" pitchFamily="34" charset="0"/>
+                <a:cs typeface="Arial" panose="020B0604020202020204" pitchFamily="34" charset="0"/>
+              </a:rPr>
+              <a:t>primeros</a:t>
+            </a:r>
+            <a:r>
+              <a:rPr lang="en-US" sz="1200" dirty="0">
+                <a:latin typeface="Arial" panose="020B0604020202020204" pitchFamily="34" charset="0"/>
+                <a:cs typeface="Arial" panose="020B0604020202020204" pitchFamily="34" charset="0"/>
+              </a:rPr>
+              <a:t> </a:t>
+            </a:r>
+            <a:r>
+              <a:rPr lang="en-US" sz="1200" dirty="0" err="1">
+                <a:latin typeface="Arial" panose="020B0604020202020204" pitchFamily="34" charset="0"/>
+                <a:cs typeface="Arial" panose="020B0604020202020204" pitchFamily="34" charset="0"/>
+              </a:rPr>
+              <a:t>modos</a:t>
+            </a:r>
+            <a:r>
+              <a:rPr lang="en-US" sz="1200" dirty="0">
+                <a:latin typeface="Arial" panose="020B0604020202020204" pitchFamily="34" charset="0"/>
+                <a:cs typeface="Arial" panose="020B0604020202020204" pitchFamily="34" charset="0"/>
+              </a:rPr>
+              <a:t> </a:t>
+            </a:r>
+            <a:r>
+              <a:rPr lang="en-US" sz="1200" dirty="0" err="1">
+                <a:latin typeface="Arial" panose="020B0604020202020204" pitchFamily="34" charset="0"/>
+                <a:cs typeface="Arial" panose="020B0604020202020204" pitchFamily="34" charset="0"/>
+              </a:rPr>
+              <a:t>calculados</a:t>
+            </a:r>
+            <a:r>
+              <a:rPr lang="en-US" sz="1200" dirty="0">
+                <a:latin typeface="Arial" panose="020B0604020202020204" pitchFamily="34" charset="0"/>
+                <a:cs typeface="Arial" panose="020B0604020202020204" pitchFamily="34" charset="0"/>
+              </a:rPr>
+              <a:t> </a:t>
+            </a:r>
+            <a:r>
+              <a:rPr lang="en-US" sz="1200" dirty="0" err="1">
+                <a:latin typeface="Arial" panose="020B0604020202020204" pitchFamily="34" charset="0"/>
+                <a:cs typeface="Arial" panose="020B0604020202020204" pitchFamily="34" charset="0"/>
+              </a:rPr>
+              <a:t>mantienen</a:t>
+            </a:r>
+            <a:r>
+              <a:rPr lang="en-US" sz="1200" dirty="0">
+                <a:latin typeface="Arial" panose="020B0604020202020204" pitchFamily="34" charset="0"/>
+                <a:cs typeface="Arial" panose="020B0604020202020204" pitchFamily="34" charset="0"/>
+              </a:rPr>
+              <a:t> </a:t>
+            </a:r>
+            <a:r>
+              <a:rPr lang="en-US" sz="1200" dirty="0" err="1">
+                <a:latin typeface="Arial" panose="020B0604020202020204" pitchFamily="34" charset="0"/>
+                <a:cs typeface="Arial" panose="020B0604020202020204" pitchFamily="34" charset="0"/>
+              </a:rPr>
+              <a:t>su</a:t>
+            </a:r>
+            <a:r>
+              <a:rPr lang="en-US" sz="1200" dirty="0">
+                <a:latin typeface="Arial" panose="020B0604020202020204" pitchFamily="34" charset="0"/>
+                <a:cs typeface="Arial" panose="020B0604020202020204" pitchFamily="34" charset="0"/>
+              </a:rPr>
+              <a:t> </a:t>
+            </a:r>
+            <a:r>
+              <a:rPr lang="en-US" sz="1200" dirty="0" err="1">
+                <a:latin typeface="Arial" panose="020B0604020202020204" pitchFamily="34" charset="0"/>
+                <a:cs typeface="Arial" panose="020B0604020202020204" pitchFamily="34" charset="0"/>
+              </a:rPr>
+              <a:t>n_eff</a:t>
+            </a:r>
+            <a:r>
+              <a:rPr lang="en-US" sz="1200" dirty="0">
+                <a:latin typeface="Arial" panose="020B0604020202020204" pitchFamily="34" charset="0"/>
+                <a:cs typeface="Arial" panose="020B0604020202020204" pitchFamily="34" charset="0"/>
+              </a:rPr>
+              <a:t> </a:t>
+            </a:r>
+            <a:r>
+              <a:rPr lang="en-US" sz="1200" dirty="0" err="1">
+                <a:latin typeface="Arial" panose="020B0604020202020204" pitchFamily="34" charset="0"/>
+                <a:cs typeface="Arial" panose="020B0604020202020204" pitchFamily="34" charset="0"/>
+              </a:rPr>
+              <a:t>por</a:t>
+            </a:r>
+            <a:r>
+              <a:rPr lang="en-US" sz="1200" dirty="0">
+                <a:latin typeface="Arial" panose="020B0604020202020204" pitchFamily="34" charset="0"/>
+                <a:cs typeface="Arial" panose="020B0604020202020204" pitchFamily="34" charset="0"/>
+              </a:rPr>
+              <a:t> </a:t>
+            </a:r>
+            <a:r>
+              <a:rPr lang="en-US" sz="1200" dirty="0" err="1">
+                <a:latin typeface="Arial" panose="020B0604020202020204" pitchFamily="34" charset="0"/>
+                <a:cs typeface="Arial" panose="020B0604020202020204" pitchFamily="34" charset="0"/>
+              </a:rPr>
+              <a:t>encima</a:t>
+            </a:r>
+            <a:r>
+              <a:rPr lang="en-US" sz="1200" dirty="0">
+                <a:latin typeface="Arial" panose="020B0604020202020204" pitchFamily="34" charset="0"/>
+                <a:cs typeface="Arial" panose="020B0604020202020204" pitchFamily="34" charset="0"/>
+              </a:rPr>
+              <a:t> del </a:t>
+            </a:r>
+            <a:r>
+              <a:rPr lang="en-US" sz="1200" dirty="0" err="1">
+                <a:latin typeface="Arial" panose="020B0604020202020204" pitchFamily="34" charset="0"/>
+                <a:cs typeface="Arial" panose="020B0604020202020204" pitchFamily="34" charset="0"/>
+              </a:rPr>
+              <a:t>índice</a:t>
+            </a:r>
+            <a:r>
+              <a:rPr lang="en-US" sz="1200" dirty="0">
+                <a:latin typeface="Arial" panose="020B0604020202020204" pitchFamily="34" charset="0"/>
+                <a:cs typeface="Arial" panose="020B0604020202020204" pitchFamily="34" charset="0"/>
+              </a:rPr>
+              <a:t> de </a:t>
+            </a:r>
+            <a:r>
+              <a:rPr lang="en-US" sz="1200" dirty="0" err="1">
+                <a:latin typeface="Arial" panose="020B0604020202020204" pitchFamily="34" charset="0"/>
+                <a:cs typeface="Arial" panose="020B0604020202020204" pitchFamily="34" charset="0"/>
+              </a:rPr>
+              <a:t>refracción</a:t>
+            </a:r>
+            <a:r>
+              <a:rPr lang="en-US" sz="1200" dirty="0">
+                <a:latin typeface="Arial" panose="020B0604020202020204" pitchFamily="34" charset="0"/>
+                <a:cs typeface="Arial" panose="020B0604020202020204" pitchFamily="34" charset="0"/>
+              </a:rPr>
+              <a:t> del cladding, </a:t>
+            </a:r>
+            <a:r>
+              <a:rPr lang="en-US" sz="1200" dirty="0" err="1">
+                <a:latin typeface="Arial" panose="020B0604020202020204" pitchFamily="34" charset="0"/>
+                <a:cs typeface="Arial" panose="020B0604020202020204" pitchFamily="34" charset="0"/>
+              </a:rPr>
+              <a:t>por</a:t>
+            </a:r>
+            <a:r>
+              <a:rPr lang="en-US" sz="1200" dirty="0">
+                <a:latin typeface="Arial" panose="020B0604020202020204" pitchFamily="34" charset="0"/>
+                <a:cs typeface="Arial" panose="020B0604020202020204" pitchFamily="34" charset="0"/>
+              </a:rPr>
+              <a:t> lo </a:t>
+            </a:r>
+            <a:r>
+              <a:rPr lang="en-US" sz="1200" dirty="0" err="1">
+                <a:latin typeface="Arial" panose="020B0604020202020204" pitchFamily="34" charset="0"/>
+                <a:cs typeface="Arial" panose="020B0604020202020204" pitchFamily="34" charset="0"/>
+              </a:rPr>
+              <a:t>que</a:t>
+            </a:r>
+            <a:r>
+              <a:rPr lang="en-US" sz="1200" dirty="0">
+                <a:latin typeface="Arial" panose="020B0604020202020204" pitchFamily="34" charset="0"/>
+                <a:cs typeface="Arial" panose="020B0604020202020204" pitchFamily="34" charset="0"/>
+              </a:rPr>
+              <a:t> solo </a:t>
+            </a:r>
+            <a:r>
+              <a:rPr lang="en-US" sz="1200" dirty="0" err="1">
+                <a:latin typeface="Arial" panose="020B0604020202020204" pitchFamily="34" charset="0"/>
+                <a:cs typeface="Arial" panose="020B0604020202020204" pitchFamily="34" charset="0"/>
+              </a:rPr>
+              <a:t>estos</a:t>
+            </a:r>
+            <a:r>
+              <a:rPr lang="en-US" sz="1200" dirty="0">
+                <a:latin typeface="Arial" panose="020B0604020202020204" pitchFamily="34" charset="0"/>
+                <a:cs typeface="Arial" panose="020B0604020202020204" pitchFamily="34" charset="0"/>
+              </a:rPr>
+              <a:t> se </a:t>
+            </a:r>
+            <a:r>
+              <a:rPr lang="en-US" sz="1200" dirty="0" err="1">
+                <a:latin typeface="Arial" panose="020B0604020202020204" pitchFamily="34" charset="0"/>
+                <a:cs typeface="Arial" panose="020B0604020202020204" pitchFamily="34" charset="0"/>
+              </a:rPr>
+              <a:t>propagan</a:t>
+            </a:r>
+            <a:r>
+              <a:rPr lang="en-US" sz="1200" dirty="0">
+                <a:latin typeface="Arial" panose="020B0604020202020204" pitchFamily="34" charset="0"/>
+                <a:cs typeface="Arial" panose="020B0604020202020204" pitchFamily="34" charset="0"/>
+              </a:rPr>
+              <a:t> a </a:t>
+            </a:r>
+            <a:r>
+              <a:rPr lang="en-US" sz="1200" dirty="0" err="1">
+                <a:latin typeface="Arial" panose="020B0604020202020204" pitchFamily="34" charset="0"/>
+                <a:cs typeface="Arial" panose="020B0604020202020204" pitchFamily="34" charset="0"/>
+              </a:rPr>
+              <a:t>través</a:t>
+            </a:r>
+            <a:r>
+              <a:rPr lang="en-US" sz="1200" dirty="0">
+                <a:latin typeface="Arial" panose="020B0604020202020204" pitchFamily="34" charset="0"/>
+                <a:cs typeface="Arial" panose="020B0604020202020204" pitchFamily="34" charset="0"/>
+              </a:rPr>
+              <a:t> de la </a:t>
+            </a:r>
+            <a:r>
+              <a:rPr lang="en-US" sz="1200" dirty="0" err="1">
+                <a:latin typeface="Arial" panose="020B0604020202020204" pitchFamily="34" charset="0"/>
+                <a:cs typeface="Arial" panose="020B0604020202020204" pitchFamily="34" charset="0"/>
+              </a:rPr>
+              <a:t>guía</a:t>
+            </a:r>
+            <a:r>
+              <a:rPr lang="en-US" sz="1200" dirty="0">
+                <a:latin typeface="Arial" panose="020B0604020202020204" pitchFamily="34" charset="0"/>
+                <a:cs typeface="Arial" panose="020B0604020202020204" pitchFamily="34" charset="0"/>
+              </a:rPr>
+              <a:t> deep. </a:t>
+            </a:r>
+            <a:r>
+              <a:rPr lang="en-US" sz="1200" dirty="0" err="1">
+                <a:latin typeface="Arial" panose="020B0604020202020204" pitchFamily="34" charset="0"/>
+                <a:cs typeface="Arial" panose="020B0604020202020204" pitchFamily="34" charset="0"/>
+              </a:rPr>
+              <a:t>Estos</a:t>
+            </a:r>
+            <a:r>
+              <a:rPr lang="en-US" sz="1200" dirty="0">
+                <a:latin typeface="Arial" panose="020B0604020202020204" pitchFamily="34" charset="0"/>
+                <a:cs typeface="Arial" panose="020B0604020202020204" pitchFamily="34" charset="0"/>
+              </a:rPr>
+              <a:t> </a:t>
+            </a:r>
+            <a:r>
+              <a:rPr lang="en-US" sz="1200" dirty="0" err="1">
+                <a:latin typeface="Arial" panose="020B0604020202020204" pitchFamily="34" charset="0"/>
+                <a:cs typeface="Arial" panose="020B0604020202020204" pitchFamily="34" charset="0"/>
+              </a:rPr>
+              <a:t>modos</a:t>
+            </a:r>
+            <a:r>
+              <a:rPr lang="en-US" sz="1200" dirty="0">
+                <a:latin typeface="Arial" panose="020B0604020202020204" pitchFamily="34" charset="0"/>
+                <a:cs typeface="Arial" panose="020B0604020202020204" pitchFamily="34" charset="0"/>
+              </a:rPr>
+              <a:t> son: TE (Mode 0) y TM (Mode 1).</a:t>
             </a:r>
           </a:p>
           <a:p>
@@ -6845,10 +7384,10 @@
       </p:pic>
       <p:pic>
         <p:nvPicPr>
-          <p:cNvPr id="12" name="Picture 11" descr="A graph of a deep wave guide&#10;&#10;AI-generated content may be incorrect.">
+          <p:cNvPr id="11" name="Picture 10" descr="A graph of a wave guide&#10;&#10;AI-generated content may be incorrect.">
             <a:extLst>
               <a:ext uri="{FF2B5EF4-FFF2-40B4-BE49-F238E27FC236}">
-                <a16:creationId xmlns:a16="http://schemas.microsoft.com/office/drawing/2014/main" id="{001803DE-E13C-4963-4310-E27E4B3157ED}"/>
+                <a16:creationId xmlns:a16="http://schemas.microsoft.com/office/drawing/2014/main" id="{3B9E150E-21CC-61CE-6322-CB9F9C656490}"/>
               </a:ext>
             </a:extLst>
           </p:cNvPr>
@@ -6865,8 +7404,8 @@
         </p:blipFill>
         <p:spPr>
           <a:xfrm>
-            <a:off x="857900" y="1571918"/>
-            <a:ext cx="4989799" cy="2910716"/>
+            <a:off x="800100" y="1503068"/>
+            <a:ext cx="5105400" cy="2978150"/>
           </a:xfrm>
           <a:prstGeom prst="rect">
             <a:avLst/>

</xml_diff>